<commit_message>
corrections training after Perth
</commit_message>
<xml_diff>
--- a/plf3_5/eXoDeveloper/700-chrommatic/700-Chromattic-en.pptx
+++ b/plf3_5/eXoDeveloper/700-chrommatic/700-Chromattic-en.pptx
@@ -8,7 +8,7 @@
     <p:sldMasterId id="2147483821" r:id="rId4"/>
   </p:sldMasterIdLst>
   <p:notesMasterIdLst>
-    <p:notesMasterId r:id="rId37"/>
+    <p:notesMasterId r:id="rId38"/>
   </p:notesMasterIdLst>
   <p:sldIdLst>
     <p:sldId id="256" r:id="rId5"/>
@@ -42,7 +42,8 @@
     <p:sldId id="279" r:id="rId33"/>
     <p:sldId id="280" r:id="rId34"/>
     <p:sldId id="282" r:id="rId35"/>
-    <p:sldId id="278" r:id="rId36"/>
+    <p:sldId id="305" r:id="rId36"/>
+    <p:sldId id="278" r:id="rId37"/>
   </p:sldIdLst>
   <p:sldSz cx="11160125" cy="7559675"/>
   <p:notesSz cx="7772400" cy="10058400"/>
@@ -5753,6 +5754,239 @@
       </p:grpSpPr>
       <p:sp>
         <p:nvSpPr>
+          <p:cNvPr id="78850" name="Rectangle 11"/>
+          <p:cNvSpPr>
+            <a:spLocks noGrp="1" noChangeArrowheads="1"/>
+          </p:cNvSpPr>
+          <p:nvPr>
+            <p:ph type="sldNum" sz="quarter"/>
+          </p:nvPr>
+        </p:nvSpPr>
+        <p:spPr>
+          <a:noFill/>
+        </p:spPr>
+        <p:txBody>
+          <a:bodyPr/>
+          <a:lstStyle/>
+          <a:p>
+            <a:fld id="{5569A835-9A0F-45BC-92DE-5D56B002B9E3}" type="slidenum">
+              <a:rPr lang="en-GB"/>
+              <a:pPr/>
+              <a:t>32</a:t>
+            </a:fld>
+            <a:endParaRPr lang="en-GB"/>
+          </a:p>
+        </p:txBody>
+      </p:sp>
+      <p:sp>
+        <p:nvSpPr>
+          <p:cNvPr id="78851" name="Text Box 1"/>
+          <p:cNvSpPr txBox="1">
+            <a:spLocks noChangeArrowheads="1"/>
+          </p:cNvSpPr>
+          <p:nvPr/>
+        </p:nvSpPr>
+        <p:spPr bwMode="auto">
+          <a:xfrm>
+            <a:off x="4398963" y="9555163"/>
+            <a:ext cx="3371850" cy="501650"/>
+          </a:xfrm>
+          <a:prstGeom prst="rect">
+            <a:avLst/>
+          </a:prstGeom>
+          <a:noFill/>
+          <a:ln w="9525">
+            <a:noFill/>
+            <a:round/>
+            <a:headEnd/>
+            <a:tailEnd/>
+          </a:ln>
+        </p:spPr>
+        <p:txBody>
+          <a:bodyPr lIns="0" tIns="0" rIns="0" bIns="0" anchor="b"/>
+          <a:lstStyle/>
+          <a:p>
+            <a:pPr algn="r">
+              <a:lnSpc>
+                <a:spcPct val="98000"/>
+              </a:lnSpc>
+              <a:buFont typeface="Wingdings" charset="2"/>
+              <a:buNone/>
+              <a:tabLst>
+                <a:tab pos="0" algn="l"/>
+                <a:tab pos="457200" algn="l"/>
+                <a:tab pos="914400" algn="l"/>
+                <a:tab pos="1371600" algn="l"/>
+                <a:tab pos="1828800" algn="l"/>
+                <a:tab pos="2286000" algn="l"/>
+                <a:tab pos="2743200" algn="l"/>
+                <a:tab pos="3200400" algn="l"/>
+                <a:tab pos="3657600" algn="l"/>
+                <a:tab pos="4114800" algn="l"/>
+                <a:tab pos="4572000" algn="l"/>
+                <a:tab pos="5029200" algn="l"/>
+                <a:tab pos="5486400" algn="l"/>
+                <a:tab pos="5943600" algn="l"/>
+                <a:tab pos="6400800" algn="l"/>
+                <a:tab pos="6858000" algn="l"/>
+                <a:tab pos="7315200" algn="l"/>
+                <a:tab pos="7772400" algn="l"/>
+                <a:tab pos="8229600" algn="l"/>
+                <a:tab pos="8686800" algn="l"/>
+                <a:tab pos="9144000" algn="l"/>
+              </a:tabLst>
+            </a:pPr>
+            <a:fld id="{59318929-C9D3-4143-A33A-E8E5761B392A}" type="slidenum">
+              <a:rPr lang="en-GB" sz="1400">
+                <a:solidFill>
+                  <a:srgbClr val="000000"/>
+                </a:solidFill>
+                <a:latin typeface="Times New Roman" pitchFamily="18" charset="0"/>
+                <a:ea typeface="Arial Unicode MS" pitchFamily="34" charset="-128"/>
+                <a:cs typeface="Arial Unicode MS" pitchFamily="34" charset="-128"/>
+              </a:rPr>
+              <a:pPr algn="r">
+                <a:lnSpc>
+                  <a:spcPct val="98000"/>
+                </a:lnSpc>
+                <a:buFont typeface="Wingdings" charset="2"/>
+                <a:buNone/>
+                <a:tabLst>
+                  <a:tab pos="0" algn="l"/>
+                  <a:tab pos="457200" algn="l"/>
+                  <a:tab pos="914400" algn="l"/>
+                  <a:tab pos="1371600" algn="l"/>
+                  <a:tab pos="1828800" algn="l"/>
+                  <a:tab pos="2286000" algn="l"/>
+                  <a:tab pos="2743200" algn="l"/>
+                  <a:tab pos="3200400" algn="l"/>
+                  <a:tab pos="3657600" algn="l"/>
+                  <a:tab pos="4114800" algn="l"/>
+                  <a:tab pos="4572000" algn="l"/>
+                  <a:tab pos="5029200" algn="l"/>
+                  <a:tab pos="5486400" algn="l"/>
+                  <a:tab pos="5943600" algn="l"/>
+                  <a:tab pos="6400800" algn="l"/>
+                  <a:tab pos="6858000" algn="l"/>
+                  <a:tab pos="7315200" algn="l"/>
+                  <a:tab pos="7772400" algn="l"/>
+                  <a:tab pos="8229600" algn="l"/>
+                  <a:tab pos="8686800" algn="l"/>
+                  <a:tab pos="9144000" algn="l"/>
+                </a:tabLst>
+              </a:pPr>
+              <a:t>32</a:t>
+            </a:fld>
+            <a:endParaRPr lang="en-GB" sz="1400">
+              <a:solidFill>
+                <a:srgbClr val="000000"/>
+              </a:solidFill>
+              <a:latin typeface="Times New Roman" pitchFamily="18" charset="0"/>
+              <a:ea typeface="Arial Unicode MS" pitchFamily="34" charset="-128"/>
+              <a:cs typeface="Arial Unicode MS" pitchFamily="34" charset="-128"/>
+            </a:endParaRPr>
+          </a:p>
+        </p:txBody>
+      </p:sp>
+      <p:sp>
+        <p:nvSpPr>
+          <p:cNvPr id="78852" name="Text Box 2"/>
+          <p:cNvSpPr txBox="1">
+            <a:spLocks noChangeArrowheads="1"/>
+          </p:cNvSpPr>
+          <p:nvPr/>
+        </p:nvSpPr>
+        <p:spPr bwMode="auto">
+          <a:xfrm>
+            <a:off x="1101725" y="763588"/>
+            <a:ext cx="5567363" cy="3771900"/>
+          </a:xfrm>
+          <a:prstGeom prst="rect">
+            <a:avLst/>
+          </a:prstGeom>
+          <a:solidFill>
+            <a:srgbClr val="FFFFFF"/>
+          </a:solidFill>
+          <a:ln w="9360">
+            <a:solidFill>
+              <a:srgbClr val="000000"/>
+            </a:solidFill>
+            <a:miter lim="800000"/>
+            <a:headEnd/>
+            <a:tailEnd/>
+          </a:ln>
+        </p:spPr>
+        <p:txBody>
+          <a:bodyPr wrap="none" anchor="ctr"/>
+          <a:lstStyle/>
+          <a:p>
+            <a:endParaRPr lang="en-US"/>
+          </a:p>
+        </p:txBody>
+      </p:sp>
+      <p:sp>
+        <p:nvSpPr>
+          <p:cNvPr id="78853" name="Text Box 3"/>
+          <p:cNvSpPr>
+            <a:spLocks noGrp="1" noChangeArrowheads="1"/>
+          </p:cNvSpPr>
+          <p:nvPr>
+            <p:ph type="body"/>
+          </p:nvPr>
+        </p:nvSpPr>
+        <p:spPr>
+          <a:xfrm>
+            <a:off x="777875" y="4776788"/>
+            <a:ext cx="6210300" cy="4519612"/>
+          </a:xfrm>
+          <a:noFill/>
+          <a:ln/>
+        </p:spPr>
+        <p:txBody>
+          <a:bodyPr wrap="none" anchor="ctr"/>
+          <a:lstStyle/>
+          <a:p>
+            <a:endParaRPr lang="en-US" smtClean="0">
+              <a:latin typeface="Times New Roman" pitchFamily="18" charset="0"/>
+            </a:endParaRPr>
+          </a:p>
+        </p:txBody>
+      </p:sp>
+    </p:spTree>
+  </p:cSld>
+  <p:clrMapOvr>
+    <a:masterClrMapping/>
+  </p:clrMapOvr>
+</p:notes>
+</file>
+
+<file path=ppt/notesSlides/notesSlide26.xml><?xml version="1.0" encoding="utf-8"?>
+<p:notes xmlns:a="http://schemas.openxmlformats.org/drawingml/2006/main" xmlns:r="http://schemas.openxmlformats.org/officeDocument/2006/relationships" xmlns:p="http://schemas.openxmlformats.org/presentationml/2006/main">
+  <p:cSld>
+    <p:bg>
+      <p:bgPr>
+        <a:solidFill>
+          <a:srgbClr val="FFFFFF"/>
+        </a:solidFill>
+        <a:effectLst/>
+      </p:bgPr>
+    </p:bg>
+    <p:spTree>
+      <p:nvGrpSpPr>
+        <p:cNvPr id="1" name=""/>
+        <p:cNvGrpSpPr/>
+        <p:nvPr/>
+      </p:nvGrpSpPr>
+      <p:grpSpPr>
+        <a:xfrm>
+          <a:off x="0" y="0"/>
+          <a:ext cx="0" cy="0"/>
+          <a:chOff x="0" y="0"/>
+          <a:chExt cx="0" cy="0"/>
+        </a:xfrm>
+      </p:grpSpPr>
+      <p:sp>
+        <p:nvSpPr>
           <p:cNvPr id="76802" name="Rectangle 11"/>
           <p:cNvSpPr>
             <a:spLocks noGrp="1" noChangeArrowheads="1"/>
@@ -5771,7 +6005,7 @@
             <a:fld id="{5A583EE1-890E-4299-9C98-D3BD4B2D7526}" type="slidenum">
               <a:rPr lang="en-GB"/>
               <a:pPr/>
-              <a:t>32</a:t>
+              <a:t>33</a:t>
             </a:fld>
             <a:endParaRPr lang="en-GB"/>
           </a:p>
@@ -5874,7 +6108,7 @@
                   <a:tab pos="9144000" algn="l"/>
                 </a:tabLst>
               </a:pPr>
-              <a:t>32</a:t>
+              <a:t>33</a:t>
             </a:fld>
             <a:endParaRPr lang="en-GB" sz="1400">
               <a:solidFill>
@@ -28955,11 +29189,6 @@
               </a:rPr>
               <a:t>Benefits</a:t>
             </a:r>
-            <a:endParaRPr lang="en-GB" sz="4800" dirty="0">
-              <a:solidFill>
-                <a:srgbClr val="FFFFFF"/>
-              </a:solidFill>
-            </a:endParaRPr>
           </a:p>
         </p:txBody>
       </p:sp>
@@ -29088,11 +29317,6 @@
               </a:rPr>
               <a:t>Benefits</a:t>
             </a:r>
-            <a:endParaRPr lang="en-GB" sz="3600" dirty="0">
-              <a:solidFill>
-                <a:srgbClr val="FFA300"/>
-              </a:solidFill>
-            </a:endParaRPr>
           </a:p>
         </p:txBody>
       </p:sp>
@@ -29164,11 +29388,6 @@
               </a:rPr>
               <a:t>Keywords</a:t>
             </a:r>
-            <a:endParaRPr lang="en-GB" sz="2800" b="1" i="1" dirty="0">
-              <a:solidFill>
-                <a:srgbClr val="333333"/>
-              </a:solidFill>
-            </a:endParaRPr>
           </a:p>
           <a:p>
             <a:pPr marL="258720" indent="-255544" hangingPunct="1">
@@ -29621,11 +29840,6 @@
               </a:rPr>
               <a:t>Benefits</a:t>
             </a:r>
-            <a:endParaRPr lang="en-GB" sz="3600" dirty="0">
-              <a:solidFill>
-                <a:srgbClr val="FFA300"/>
-              </a:solidFill>
-            </a:endParaRPr>
           </a:p>
         </p:txBody>
       </p:sp>
@@ -29697,11 +29911,6 @@
               </a:rPr>
               <a:t>Details</a:t>
             </a:r>
-            <a:endParaRPr lang="en-GB" sz="2800" b="1" i="1" dirty="0">
-              <a:solidFill>
-                <a:srgbClr val="333333"/>
-              </a:solidFill>
-            </a:endParaRPr>
           </a:p>
           <a:p>
             <a:pPr marL="258720" indent="-255544" hangingPunct="1">
@@ -29935,15 +30144,7 @@
                   <a:srgbClr val="4C4C4C"/>
                 </a:solidFill>
               </a:rPr>
-              <a:t>C</a:t>
-            </a:r>
-            <a:r>
-              <a:rPr lang="en-US" sz="2000" b="1" i="1" dirty="0">
-                <a:solidFill>
-                  <a:srgbClr val="4C4C4C"/>
-                </a:solidFill>
-              </a:rPr>
-              <a:t>ode completion</a:t>
+              <a:t>Code completion</a:t>
             </a:r>
           </a:p>
           <a:p>
@@ -30268,11 +30469,6 @@
               </a:rPr>
               <a:t>Concept</a:t>
             </a:r>
-            <a:endParaRPr lang="en-GB" sz="4800" dirty="0">
-              <a:solidFill>
-                <a:srgbClr val="FFFFFF"/>
-              </a:solidFill>
-            </a:endParaRPr>
           </a:p>
         </p:txBody>
       </p:sp>
@@ -30401,11 +30597,6 @@
               </a:rPr>
               <a:t>Concept</a:t>
             </a:r>
-            <a:endParaRPr lang="en-GB" sz="3600" dirty="0">
-              <a:solidFill>
-                <a:srgbClr val="FFA300"/>
-              </a:solidFill>
-            </a:endParaRPr>
           </a:p>
         </p:txBody>
       </p:sp>
@@ -31581,11 +31772,6 @@
               </a:rPr>
               <a:t>Object Lifecycle</a:t>
             </a:r>
-            <a:endParaRPr lang="en-GB" sz="3600" dirty="0">
-              <a:solidFill>
-                <a:srgbClr val="FFA300"/>
-              </a:solidFill>
-            </a:endParaRPr>
           </a:p>
         </p:txBody>
       </p:sp>
@@ -32477,11 +32663,6 @@
               </a:rPr>
               <a:t>Class Generation</a:t>
             </a:r>
-            <a:endParaRPr lang="en-GB" sz="3600" dirty="0">
-              <a:solidFill>
-                <a:srgbClr val="FFA300"/>
-              </a:solidFill>
-            </a:endParaRPr>
           </a:p>
         </p:txBody>
       </p:sp>
@@ -32883,14 +33064,6 @@
                 </a:rPr>
                 <a:t>java</a:t>
               </a:r>
-              <a:endParaRPr lang="en-US" sz="1600" b="1" kern="0" dirty="0">
-                <a:solidFill>
-                  <a:sysClr val="windowText" lastClr="000000"/>
-                </a:solidFill>
-                <a:latin typeface="Monaco"/>
-                <a:ea typeface="+mn-ea"/>
-                <a:cs typeface="Monaco"/>
-              </a:endParaRPr>
             </a:p>
           </p:txBody>
         </p:sp>
@@ -33079,14 +33252,6 @@
                 </a:rPr>
                 <a:t>class</a:t>
               </a:r>
-              <a:endParaRPr lang="en-US" sz="1600" b="1" kern="0" dirty="0">
-                <a:solidFill>
-                  <a:srgbClr val="000000"/>
-                </a:solidFill>
-                <a:latin typeface="Monaco" pitchFamily="-109" charset="0"/>
-                <a:ea typeface="Monaco" pitchFamily="-109" charset="0"/>
-                <a:cs typeface="Monaco" pitchFamily="-109" charset="0"/>
-              </a:endParaRPr>
             </a:p>
           </p:txBody>
         </p:sp>
@@ -33821,11 +33986,6 @@
               </a:rPr>
               <a:t>Property Mapping</a:t>
             </a:r>
-            <a:endParaRPr lang="en-GB" sz="4800" dirty="0">
-              <a:solidFill>
-                <a:srgbClr val="FFFFFF"/>
-              </a:solidFill>
-            </a:endParaRPr>
           </a:p>
         </p:txBody>
       </p:sp>
@@ -35270,7 +35430,7 @@
                 </a:solidFill>
                 <a:sym typeface="Helvetica Neue Light" charset="0"/>
               </a:rPr>
-              <a:t>Chrommatic</a:t>
+              <a:t>Chromattic</a:t>
             </a:r>
             <a:r>
               <a:rPr lang="en-GB" b="1" dirty="0" smtClean="0">
@@ -35379,7 +35539,41 @@
                 </a:solidFill>
                 <a:sym typeface="Helvetica Neue Light" charset="0"/>
               </a:rPr>
-              <a:t>How-To</a:t>
+              <a:t>How-</a:t>
+            </a:r>
+            <a:r>
+              <a:rPr lang="en-GB" b="1" dirty="0" smtClean="0">
+                <a:solidFill>
+                  <a:srgbClr val="4C4C4C"/>
+                </a:solidFill>
+                <a:sym typeface="Helvetica Neue Light" charset="0"/>
+              </a:rPr>
+              <a:t>To</a:t>
+            </a:r>
+          </a:p>
+          <a:p>
+            <a:pPr defTabSz="455115" eaLnBrk="1" hangingPunct="1">
+              <a:lnSpc>
+                <a:spcPct val="101000"/>
+              </a:lnSpc>
+              <a:spcAft>
+                <a:spcPts val="1425"/>
+              </a:spcAft>
+              <a:buClr>
+                <a:srgbClr val="FFA300"/>
+              </a:buClr>
+              <a:buSzPct val="150000"/>
+              <a:buFont typeface="Segoe UI" charset="0"/>
+              <a:buChar char="»"/>
+            </a:pPr>
+            <a:r>
+              <a:rPr lang="en-GB" b="1" dirty="0" smtClean="0">
+                <a:solidFill>
+                  <a:srgbClr val="4C4C4C"/>
+                </a:solidFill>
+                <a:sym typeface="Helvetica Neue Light" charset="0"/>
+              </a:rPr>
+              <a:t>Exercise</a:t>
             </a:r>
             <a:endParaRPr lang="en-GB" b="1" dirty="0">
               <a:solidFill>
@@ -37056,17 +37250,8 @@
               <a:rPr lang="en-US" sz="1900" b="1" dirty="0">
                 <a:latin typeface="Monaco" pitchFamily="-109" charset="0"/>
               </a:rPr>
-              <a:t>  </a:t>
-            </a:r>
-            <a:r>
-              <a:rPr lang="en-US" sz="1900" b="1" dirty="0">
-                <a:latin typeface="Monaco" pitchFamily="-109" charset="0"/>
-              </a:rPr>
-              <a:t>}</a:t>
-            </a:r>
-            <a:endParaRPr lang="en-US" sz="1900" b="1" dirty="0">
-              <a:latin typeface="Monaco" pitchFamily="-109" charset="0"/>
-            </a:endParaRPr>
+              <a:t>  }</a:t>
+            </a:r>
           </a:p>
           <a:p>
             <a:pPr>
@@ -37463,11 +37648,6 @@
               </a:rPr>
               <a:t>How-to</a:t>
             </a:r>
-            <a:endParaRPr lang="en-GB" sz="3600" dirty="0">
-              <a:solidFill>
-                <a:srgbClr val="FFA300"/>
-              </a:solidFill>
-            </a:endParaRPr>
           </a:p>
         </p:txBody>
       </p:sp>
@@ -37539,11 +37719,6 @@
               </a:rPr>
               <a:t>Example</a:t>
             </a:r>
-            <a:endParaRPr lang="en-GB" sz="2800" b="1" i="1" dirty="0">
-              <a:solidFill>
-                <a:srgbClr val="333333"/>
-              </a:solidFill>
-            </a:endParaRPr>
           </a:p>
           <a:p>
             <a:pPr marL="258720" indent="-255544" hangingPunct="1">
@@ -38109,11 +38284,6 @@
               </a:rPr>
               <a:t>How-to</a:t>
             </a:r>
-            <a:endParaRPr lang="en-GB" sz="3600" dirty="0">
-              <a:solidFill>
-                <a:srgbClr val="FFA300"/>
-              </a:solidFill>
-            </a:endParaRPr>
           </a:p>
         </p:txBody>
       </p:sp>
@@ -38933,11 +39103,6 @@
               </a:rPr>
               <a:t>How-to</a:t>
             </a:r>
-            <a:endParaRPr lang="en-GB" sz="3600" dirty="0">
-              <a:solidFill>
-                <a:srgbClr val="FFA300"/>
-              </a:solidFill>
-            </a:endParaRPr>
           </a:p>
         </p:txBody>
       </p:sp>
@@ -39811,11 +39976,6 @@
               </a:rPr>
               <a:t>How-to</a:t>
             </a:r>
-            <a:endParaRPr lang="en-GB" sz="3600" dirty="0">
-              <a:solidFill>
-                <a:srgbClr val="FFA300"/>
-              </a:solidFill>
-            </a:endParaRPr>
           </a:p>
         </p:txBody>
       </p:sp>
@@ -40656,11 +40816,6 @@
               </a:rPr>
               <a:t>What</a:t>
             </a:r>
-            <a:endParaRPr lang="en-GB" sz="2800" b="1" i="1" dirty="0">
-              <a:solidFill>
-                <a:srgbClr val="333333"/>
-              </a:solidFill>
-            </a:endParaRPr>
           </a:p>
           <a:p>
             <a:pPr marL="258720" indent="-255544" hangingPunct="1">
@@ -41049,11 +41204,6 @@
               </a:rPr>
               <a:t>Multiple Values</a:t>
             </a:r>
-            <a:endParaRPr lang="en-GB" sz="3600" dirty="0">
-              <a:solidFill>
-                <a:srgbClr val="FFA300"/>
-              </a:solidFill>
-            </a:endParaRPr>
           </a:p>
         </p:txBody>
       </p:sp>
@@ -41799,11 +41949,6 @@
               </a:rPr>
               <a:t>Parent-Child Relation</a:t>
             </a:r>
-            <a:endParaRPr lang="en-GB" sz="3600" dirty="0">
-              <a:solidFill>
-                <a:srgbClr val="FFA300"/>
-              </a:solidFill>
-            </a:endParaRPr>
           </a:p>
         </p:txBody>
       </p:sp>
@@ -42290,7 +42435,7 @@
               <a:t>@</a:t>
             </a:r>
             <a:r>
-              <a:rPr lang="fr-FR" sz="2000" dirty="0" err="1">
+              <a:rPr lang="fr-FR" sz="2000" dirty="0" err="1" smtClean="0">
                 <a:solidFill>
                   <a:srgbClr val="000000"/>
                 </a:solidFill>
@@ -43015,6 +43160,1609 @@
 </file>
 
 <file path=ppt/slides/slide32.xml><?xml version="1.0" encoding="utf-8"?>
+<p:sld xmlns:a="http://schemas.openxmlformats.org/drawingml/2006/main" xmlns:r="http://schemas.openxmlformats.org/officeDocument/2006/relationships" xmlns:p="http://schemas.openxmlformats.org/presentationml/2006/main">
+  <p:cSld>
+    <p:spTree>
+      <p:nvGrpSpPr>
+        <p:cNvPr id="1" name=""/>
+        <p:cNvGrpSpPr/>
+        <p:nvPr/>
+      </p:nvGrpSpPr>
+      <p:grpSpPr>
+        <a:xfrm>
+          <a:off x="0" y="0"/>
+          <a:ext cx="0" cy="0"/>
+          <a:chOff x="0" y="0"/>
+          <a:chExt cx="0" cy="0"/>
+        </a:xfrm>
+      </p:grpSpPr>
+      <p:sp>
+        <p:nvSpPr>
+          <p:cNvPr id="77826" name="Text Box 1"/>
+          <p:cNvSpPr txBox="1">
+            <a:spLocks noChangeArrowheads="1"/>
+          </p:cNvSpPr>
+          <p:nvPr/>
+        </p:nvSpPr>
+        <p:spPr bwMode="auto">
+          <a:xfrm>
+            <a:off x="557214" y="301627"/>
+            <a:ext cx="10044113" cy="614363"/>
+          </a:xfrm>
+          <a:prstGeom prst="rect">
+            <a:avLst/>
+          </a:prstGeom>
+          <a:noFill/>
+          <a:ln w="9525">
+            <a:noFill/>
+            <a:round/>
+            <a:headEnd/>
+            <a:tailEnd/>
+          </a:ln>
+        </p:spPr>
+        <p:txBody>
+          <a:bodyPr lIns="0" tIns="0" rIns="0" bIns="0" anchor="ctr"/>
+          <a:lstStyle/>
+          <a:p>
+            <a:pPr hangingPunct="1">
+              <a:lnSpc>
+                <a:spcPct val="92000"/>
+              </a:lnSpc>
+              <a:tabLst>
+                <a:tab pos="0" algn="l"/>
+                <a:tab pos="457124" algn="l"/>
+                <a:tab pos="914244" algn="l"/>
+                <a:tab pos="1371368" algn="l"/>
+                <a:tab pos="1828491" algn="l"/>
+                <a:tab pos="2285612" algn="l"/>
+                <a:tab pos="2742736" algn="l"/>
+                <a:tab pos="3199858" algn="l"/>
+                <a:tab pos="3656980" algn="l"/>
+                <a:tab pos="4114103" algn="l"/>
+                <a:tab pos="4571225" algn="l"/>
+                <a:tab pos="5028348" algn="l"/>
+                <a:tab pos="5485471" algn="l"/>
+                <a:tab pos="5942593" algn="l"/>
+                <a:tab pos="6399715" algn="l"/>
+                <a:tab pos="6856838" algn="l"/>
+                <a:tab pos="7313961" algn="l"/>
+                <a:tab pos="7771083" algn="l"/>
+                <a:tab pos="8228206" algn="l"/>
+                <a:tab pos="8685328" algn="l"/>
+                <a:tab pos="9142452" algn="l"/>
+                <a:tab pos="9409106" algn="l"/>
+              </a:tabLst>
+            </a:pPr>
+            <a:r>
+              <a:rPr lang="en-GB" sz="3600" dirty="0" smtClean="0">
+                <a:solidFill>
+                  <a:srgbClr val="FFA300"/>
+                </a:solidFill>
+              </a:rPr>
+              <a:t>Exercise: </a:t>
+            </a:r>
+            <a:r>
+              <a:rPr lang="en-GB" sz="3600" dirty="0" err="1" smtClean="0">
+                <a:solidFill>
+                  <a:srgbClr val="FFA300"/>
+                </a:solidFill>
+              </a:rPr>
+              <a:t>Chromattic</a:t>
+            </a:r>
+            <a:endParaRPr lang="en-GB" sz="3600" dirty="0">
+              <a:solidFill>
+                <a:srgbClr val="FFA300"/>
+              </a:solidFill>
+            </a:endParaRPr>
+          </a:p>
+        </p:txBody>
+      </p:sp>
+      <p:sp>
+        <p:nvSpPr>
+          <p:cNvPr id="77827" name="Text Box 2"/>
+          <p:cNvSpPr txBox="1">
+            <a:spLocks noChangeArrowheads="1"/>
+          </p:cNvSpPr>
+          <p:nvPr/>
+        </p:nvSpPr>
+        <p:spPr bwMode="auto">
+          <a:xfrm>
+            <a:off x="293650" y="1350945"/>
+            <a:ext cx="10542996" cy="5105400"/>
+          </a:xfrm>
+          <a:prstGeom prst="rect">
+            <a:avLst/>
+          </a:prstGeom>
+          <a:noFill/>
+          <a:ln w="9525">
+            <a:noFill/>
+            <a:round/>
+            <a:headEnd/>
+            <a:tailEnd/>
+          </a:ln>
+        </p:spPr>
+        <p:txBody>
+          <a:bodyPr lIns="0" tIns="0" rIns="0" bIns="0"/>
+          <a:lstStyle/>
+          <a:p>
+            <a:pPr marL="258720" indent="-255544" hangingPunct="1">
+              <a:lnSpc>
+                <a:spcPct val="101000"/>
+              </a:lnSpc>
+              <a:spcAft>
+                <a:spcPts val="1425"/>
+              </a:spcAft>
+              <a:buClr>
+                <a:srgbClr val="FFA300"/>
+              </a:buClr>
+              <a:buSzPct val="150000"/>
+              <a:buFont typeface="Segoe UI" pitchFamily="32" charset="0"/>
+              <a:buChar char="»"/>
+              <a:tabLst>
+                <a:tab pos="258720" algn="l"/>
+                <a:tab pos="715842" algn="l"/>
+                <a:tab pos="1172964" algn="l"/>
+                <a:tab pos="1630086" algn="l"/>
+                <a:tab pos="2087210" algn="l"/>
+                <a:tab pos="2544332" algn="l"/>
+                <a:tab pos="3001454" algn="l"/>
+                <a:tab pos="3458576" algn="l"/>
+                <a:tab pos="3915700" algn="l"/>
+                <a:tab pos="4372822" algn="l"/>
+                <a:tab pos="4829945" algn="l"/>
+                <a:tab pos="5287068" algn="l"/>
+                <a:tab pos="5744189" algn="l"/>
+                <a:tab pos="6201313" algn="l"/>
+                <a:tab pos="6658435" algn="l"/>
+                <a:tab pos="7115557" algn="l"/>
+                <a:tab pos="7572681" algn="l"/>
+                <a:tab pos="8029802" algn="l"/>
+                <a:tab pos="8486925" algn="l"/>
+                <a:tab pos="8944049" algn="l"/>
+                <a:tab pos="9401170" algn="l"/>
+              </a:tabLst>
+            </a:pPr>
+            <a:r>
+              <a:rPr lang="de-DE" sz="2000" b="1" dirty="0">
+                <a:solidFill>
+                  <a:srgbClr val="4C4C4C"/>
+                </a:solidFill>
+              </a:rPr>
+              <a:t>In </a:t>
+            </a:r>
+            <a:r>
+              <a:rPr lang="de-DE" sz="2000" b="1" dirty="0" err="1">
+                <a:solidFill>
+                  <a:srgbClr val="4C4C4C"/>
+                </a:solidFill>
+              </a:rPr>
+              <a:t>the</a:t>
+            </a:r>
+            <a:r>
+              <a:rPr lang="de-DE" sz="2000" b="1" dirty="0">
+                <a:solidFill>
+                  <a:srgbClr val="4C4C4C"/>
+                </a:solidFill>
+              </a:rPr>
+              <a:t> </a:t>
+            </a:r>
+            <a:r>
+              <a:rPr lang="de-DE" sz="2000" b="1" dirty="0" err="1">
+                <a:solidFill>
+                  <a:srgbClr val="4C4C4C"/>
+                </a:solidFill>
+              </a:rPr>
+              <a:t>data</a:t>
+            </a:r>
+            <a:r>
+              <a:rPr lang="de-DE" sz="2000" b="1" dirty="0">
+                <a:solidFill>
+                  <a:srgbClr val="4C4C4C"/>
+                </a:solidFill>
+              </a:rPr>
+              <a:t> </a:t>
+            </a:r>
+            <a:r>
+              <a:rPr lang="de-DE" sz="2000" b="1" dirty="0" err="1">
+                <a:solidFill>
+                  <a:srgbClr val="4C4C4C"/>
+                </a:solidFill>
+              </a:rPr>
+              <a:t>folder</a:t>
+            </a:r>
+            <a:r>
+              <a:rPr lang="de-DE" sz="2000" b="1" dirty="0">
+                <a:solidFill>
+                  <a:srgbClr val="4C4C4C"/>
+                </a:solidFill>
+              </a:rPr>
+              <a:t>, </a:t>
+            </a:r>
+            <a:r>
+              <a:rPr lang="de-DE" sz="2000" b="1" dirty="0" err="1">
+                <a:solidFill>
+                  <a:srgbClr val="4C4C4C"/>
+                </a:solidFill>
+              </a:rPr>
+              <a:t>create</a:t>
+            </a:r>
+            <a:r>
+              <a:rPr lang="de-DE" sz="2000" b="1" dirty="0">
+                <a:solidFill>
+                  <a:srgbClr val="4C4C4C"/>
+                </a:solidFill>
+              </a:rPr>
+              <a:t> </a:t>
+            </a:r>
+            <a:r>
+              <a:rPr lang="de-DE" sz="2000" b="1" dirty="0" err="1">
+                <a:solidFill>
+                  <a:srgbClr val="4C4C4C"/>
+                </a:solidFill>
+              </a:rPr>
+              <a:t>node</a:t>
+            </a:r>
+            <a:r>
+              <a:rPr lang="de-DE" sz="2000" b="1" dirty="0">
+                <a:solidFill>
+                  <a:srgbClr val="4C4C4C"/>
+                </a:solidFill>
+              </a:rPr>
+              <a:t> </a:t>
+            </a:r>
+            <a:r>
+              <a:rPr lang="de-DE" sz="2000" b="1" dirty="0" err="1">
+                <a:solidFill>
+                  <a:srgbClr val="4C4C4C"/>
+                </a:solidFill>
+              </a:rPr>
+              <a:t>types</a:t>
+            </a:r>
+            <a:r>
+              <a:rPr lang="de-DE" sz="2000" b="1" dirty="0">
+                <a:solidFill>
+                  <a:srgbClr val="4C4C4C"/>
+                </a:solidFill>
+              </a:rPr>
+              <a:t> (</a:t>
+            </a:r>
+            <a:r>
+              <a:rPr lang="de-DE" sz="2000" b="1" dirty="0" err="1">
+                <a:solidFill>
+                  <a:srgbClr val="4C4C4C"/>
+                </a:solidFill>
+              </a:rPr>
+              <a:t>upper</a:t>
+            </a:r>
+            <a:r>
+              <a:rPr lang="de-DE" sz="2000" b="1" dirty="0">
+                <a:solidFill>
+                  <a:srgbClr val="4C4C4C"/>
+                </a:solidFill>
+              </a:rPr>
+              <a:t> </a:t>
+            </a:r>
+            <a:r>
+              <a:rPr lang="de-DE" sz="2000" b="1" dirty="0" err="1">
+                <a:solidFill>
+                  <a:srgbClr val="4C4C4C"/>
+                </a:solidFill>
+              </a:rPr>
+              <a:t>right</a:t>
+            </a:r>
+            <a:r>
+              <a:rPr lang="de-DE" sz="2000" b="1" dirty="0">
+                <a:solidFill>
+                  <a:srgbClr val="4C4C4C"/>
+                </a:solidFill>
+              </a:rPr>
+              <a:t> </a:t>
+            </a:r>
+            <a:r>
+              <a:rPr lang="de-DE" sz="2000" b="1" dirty="0" err="1">
+                <a:solidFill>
+                  <a:srgbClr val="4C4C4C"/>
+                </a:solidFill>
+              </a:rPr>
+              <a:t>corner</a:t>
+            </a:r>
+            <a:r>
+              <a:rPr lang="de-DE" sz="2000" b="1" dirty="0">
+                <a:solidFill>
+                  <a:srgbClr val="4C4C4C"/>
+                </a:solidFill>
+              </a:rPr>
+              <a:t>) </a:t>
+            </a:r>
+            <a:r>
+              <a:rPr lang="de-DE" sz="2000" b="1" dirty="0" err="1" smtClean="0">
+                <a:solidFill>
+                  <a:srgbClr val="4C4C4C"/>
+                </a:solidFill>
+              </a:rPr>
+              <a:t>for</a:t>
+            </a:r>
+            <a:r>
+              <a:rPr lang="de-DE" sz="2000" b="1" dirty="0" smtClean="0">
+                <a:solidFill>
+                  <a:srgbClr val="4C4C4C"/>
+                </a:solidFill>
+              </a:rPr>
+              <a:t> </a:t>
+            </a:r>
+            <a:r>
+              <a:rPr lang="de-DE" sz="2000" b="1" dirty="0" err="1" smtClean="0">
+                <a:solidFill>
+                  <a:srgbClr val="4C4C4C"/>
+                </a:solidFill>
+              </a:rPr>
+              <a:t>cmtc</a:t>
+            </a:r>
+            <a:r>
+              <a:rPr lang="de-DE" sz="2000" b="1" dirty="0" smtClean="0">
+                <a:solidFill>
+                  <a:srgbClr val="4C4C4C"/>
+                </a:solidFill>
+              </a:rPr>
+              <a:t> </a:t>
+            </a:r>
+            <a:r>
+              <a:rPr lang="de-DE" sz="2000" b="1" dirty="0" err="1" smtClean="0">
+                <a:solidFill>
+                  <a:srgbClr val="4C4C4C"/>
+                </a:solidFill>
+              </a:rPr>
+              <a:t>files</a:t>
+            </a:r>
+            <a:r>
+              <a:rPr lang="de-DE" sz="2000" b="1" dirty="0" smtClean="0">
+                <a:solidFill>
+                  <a:srgbClr val="4C4C4C"/>
+                </a:solidFill>
+              </a:rPr>
+              <a:t>.</a:t>
+            </a:r>
+            <a:endParaRPr lang="de-DE" sz="2000" b="1" dirty="0">
+              <a:solidFill>
+                <a:srgbClr val="4C4C4C"/>
+              </a:solidFill>
+            </a:endParaRPr>
+          </a:p>
+          <a:p>
+            <a:pPr marL="258720" indent="-255544" hangingPunct="1">
+              <a:lnSpc>
+                <a:spcPct val="101000"/>
+              </a:lnSpc>
+              <a:spcAft>
+                <a:spcPts val="1425"/>
+              </a:spcAft>
+              <a:buClr>
+                <a:srgbClr val="FFA300"/>
+              </a:buClr>
+              <a:buSzPct val="150000"/>
+              <a:buFont typeface="Segoe UI" pitchFamily="32" charset="0"/>
+              <a:buChar char="»"/>
+              <a:tabLst>
+                <a:tab pos="258720" algn="l"/>
+                <a:tab pos="715842" algn="l"/>
+                <a:tab pos="1172964" algn="l"/>
+                <a:tab pos="1630086" algn="l"/>
+                <a:tab pos="2087210" algn="l"/>
+                <a:tab pos="2544332" algn="l"/>
+                <a:tab pos="3001454" algn="l"/>
+                <a:tab pos="3458576" algn="l"/>
+                <a:tab pos="3915700" algn="l"/>
+                <a:tab pos="4372822" algn="l"/>
+                <a:tab pos="4829945" algn="l"/>
+                <a:tab pos="5287068" algn="l"/>
+                <a:tab pos="5744189" algn="l"/>
+                <a:tab pos="6201313" algn="l"/>
+                <a:tab pos="6658435" algn="l"/>
+                <a:tab pos="7115557" algn="l"/>
+                <a:tab pos="7572681" algn="l"/>
+                <a:tab pos="8029802" algn="l"/>
+                <a:tab pos="8486925" algn="l"/>
+                <a:tab pos="8944049" algn="l"/>
+                <a:tab pos="9401170" algn="l"/>
+              </a:tabLst>
+            </a:pPr>
+            <a:r>
+              <a:rPr lang="de-DE" sz="2000" b="1" dirty="0">
+                <a:solidFill>
+                  <a:srgbClr val="4C4C4C"/>
+                </a:solidFill>
+              </a:rPr>
+              <a:t>In </a:t>
+            </a:r>
+            <a:r>
+              <a:rPr lang="de-DE" sz="2000" b="1" dirty="0" err="1">
+                <a:solidFill>
+                  <a:srgbClr val="4C4C4C"/>
+                </a:solidFill>
+              </a:rPr>
+              <a:t>the</a:t>
+            </a:r>
+            <a:r>
+              <a:rPr lang="de-DE" sz="2000" b="1" dirty="0">
+                <a:solidFill>
+                  <a:srgbClr val="4C4C4C"/>
+                </a:solidFill>
+              </a:rPr>
+              <a:t> </a:t>
+            </a:r>
+            <a:r>
+              <a:rPr lang="de-DE" sz="2000" b="1" dirty="0" err="1">
+                <a:solidFill>
+                  <a:srgbClr val="4C4C4C"/>
+                </a:solidFill>
+              </a:rPr>
+              <a:t>logic</a:t>
+            </a:r>
+            <a:r>
+              <a:rPr lang="de-DE" sz="2000" b="1" dirty="0">
+                <a:solidFill>
+                  <a:srgbClr val="4C4C4C"/>
+                </a:solidFill>
+              </a:rPr>
+              <a:t> </a:t>
+            </a:r>
+            <a:r>
+              <a:rPr lang="de-DE" sz="2000" b="1" dirty="0" err="1">
+                <a:solidFill>
+                  <a:srgbClr val="4C4C4C"/>
+                </a:solidFill>
+              </a:rPr>
+              <a:t>folder</a:t>
+            </a:r>
+            <a:r>
+              <a:rPr lang="de-DE" sz="2000" b="1" dirty="0">
+                <a:solidFill>
+                  <a:srgbClr val="4C4C4C"/>
+                </a:solidFill>
+              </a:rPr>
+              <a:t>, </a:t>
+            </a:r>
+            <a:r>
+              <a:rPr lang="de-DE" sz="2000" b="1" dirty="0" err="1">
+                <a:solidFill>
+                  <a:srgbClr val="4C4C4C"/>
+                </a:solidFill>
+              </a:rPr>
+              <a:t>deploy</a:t>
+            </a:r>
+            <a:r>
+              <a:rPr lang="de-DE" sz="2000" b="1" dirty="0">
+                <a:solidFill>
+                  <a:srgbClr val="4C4C4C"/>
+                </a:solidFill>
+              </a:rPr>
+              <a:t> </a:t>
+            </a:r>
+            <a:r>
+              <a:rPr lang="de-DE" sz="2000" b="1" dirty="0" err="1">
+                <a:solidFill>
+                  <a:srgbClr val="4C4C4C"/>
+                </a:solidFill>
+              </a:rPr>
+              <a:t>the</a:t>
+            </a:r>
+            <a:r>
+              <a:rPr lang="de-DE" sz="2000" b="1" dirty="0">
+                <a:solidFill>
+                  <a:srgbClr val="4C4C4C"/>
+                </a:solidFill>
+              </a:rPr>
+              <a:t> </a:t>
+            </a:r>
+            <a:r>
+              <a:rPr lang="de-DE" sz="2000" b="1" dirty="0" err="1" smtClean="0">
+                <a:solidFill>
+                  <a:srgbClr val="4C4C4C"/>
+                </a:solidFill>
+              </a:rPr>
+              <a:t>PhoneBookRestService.grs</a:t>
+            </a:r>
+            <a:r>
+              <a:rPr lang="de-DE" sz="2000" b="1" dirty="0" smtClean="0">
+                <a:solidFill>
+                  <a:srgbClr val="4C4C4C"/>
+                </a:solidFill>
+              </a:rPr>
+              <a:t> REST </a:t>
+            </a:r>
+            <a:r>
+              <a:rPr lang="de-DE" sz="2000" b="1" dirty="0" err="1" smtClean="0">
+                <a:solidFill>
+                  <a:srgbClr val="4C4C4C"/>
+                </a:solidFill>
+              </a:rPr>
+              <a:t>service</a:t>
+            </a:r>
+            <a:r>
+              <a:rPr lang="de-DE" sz="2000" b="1" smtClean="0">
+                <a:solidFill>
+                  <a:srgbClr val="4C4C4C"/>
+                </a:solidFill>
+              </a:rPr>
+              <a:t>.</a:t>
+            </a:r>
+            <a:endParaRPr lang="de-DE" sz="2000" b="1" dirty="0">
+              <a:solidFill>
+                <a:srgbClr val="4C4C4C"/>
+              </a:solidFill>
+            </a:endParaRPr>
+          </a:p>
+          <a:p>
+            <a:pPr marL="258720" indent="-255544" hangingPunct="1">
+              <a:lnSpc>
+                <a:spcPct val="101000"/>
+              </a:lnSpc>
+              <a:spcAft>
+                <a:spcPts val="1425"/>
+              </a:spcAft>
+              <a:buClr>
+                <a:srgbClr val="FFA300"/>
+              </a:buClr>
+              <a:buSzPct val="150000"/>
+              <a:buFont typeface="Segoe UI" pitchFamily="32" charset="0"/>
+              <a:buChar char="»"/>
+              <a:tabLst>
+                <a:tab pos="258720" algn="l"/>
+                <a:tab pos="715842" algn="l"/>
+                <a:tab pos="1172964" algn="l"/>
+                <a:tab pos="1630086" algn="l"/>
+                <a:tab pos="2087210" algn="l"/>
+                <a:tab pos="2544332" algn="l"/>
+                <a:tab pos="3001454" algn="l"/>
+                <a:tab pos="3458576" algn="l"/>
+                <a:tab pos="3915700" algn="l"/>
+                <a:tab pos="4372822" algn="l"/>
+                <a:tab pos="4829945" algn="l"/>
+                <a:tab pos="5287068" algn="l"/>
+                <a:tab pos="5744189" algn="l"/>
+                <a:tab pos="6201313" algn="l"/>
+                <a:tab pos="6658435" algn="l"/>
+                <a:tab pos="7115557" algn="l"/>
+                <a:tab pos="7572681" algn="l"/>
+                <a:tab pos="8029802" algn="l"/>
+                <a:tab pos="8486925" algn="l"/>
+                <a:tab pos="8944049" algn="l"/>
+                <a:tab pos="9401170" algn="l"/>
+              </a:tabLst>
+            </a:pPr>
+            <a:r>
+              <a:rPr lang="de-DE" sz="2000" b="1" dirty="0">
+                <a:solidFill>
+                  <a:srgbClr val="4C4C4C"/>
+                </a:solidFill>
+              </a:rPr>
+              <a:t>In </a:t>
+            </a:r>
+            <a:r>
+              <a:rPr lang="de-DE" sz="2000" b="1" dirty="0" err="1">
+                <a:solidFill>
+                  <a:srgbClr val="4C4C4C"/>
+                </a:solidFill>
+              </a:rPr>
+              <a:t>the</a:t>
+            </a:r>
+            <a:r>
+              <a:rPr lang="de-DE" sz="2000" b="1" dirty="0">
+                <a:solidFill>
+                  <a:srgbClr val="4C4C4C"/>
+                </a:solidFill>
+              </a:rPr>
+              <a:t> UI </a:t>
+            </a:r>
+            <a:r>
+              <a:rPr lang="de-DE" sz="2000" b="1" dirty="0" err="1">
+                <a:solidFill>
+                  <a:srgbClr val="4C4C4C"/>
+                </a:solidFill>
+              </a:rPr>
+              <a:t>folder</a:t>
+            </a:r>
+            <a:r>
+              <a:rPr lang="de-DE" sz="2000" b="1" dirty="0">
+                <a:solidFill>
+                  <a:srgbClr val="4C4C4C"/>
+                </a:solidFill>
+              </a:rPr>
+              <a:t>, </a:t>
+            </a:r>
+            <a:r>
+              <a:rPr lang="de-DE" sz="2000" b="1" dirty="0" err="1">
+                <a:solidFill>
+                  <a:srgbClr val="4C4C4C"/>
+                </a:solidFill>
+              </a:rPr>
+              <a:t>you</a:t>
+            </a:r>
+            <a:r>
+              <a:rPr lang="de-DE" sz="2000" b="1" dirty="0">
+                <a:solidFill>
+                  <a:srgbClr val="4C4C4C"/>
+                </a:solidFill>
+              </a:rPr>
+              <a:t> </a:t>
+            </a:r>
+            <a:r>
+              <a:rPr lang="de-DE" sz="2000" b="1" dirty="0" err="1">
+                <a:solidFill>
+                  <a:srgbClr val="4C4C4C"/>
+                </a:solidFill>
+              </a:rPr>
+              <a:t>need</a:t>
+            </a:r>
+            <a:r>
+              <a:rPr lang="de-DE" sz="2000" b="1" dirty="0">
+                <a:solidFill>
+                  <a:srgbClr val="4C4C4C"/>
+                </a:solidFill>
+              </a:rPr>
+              <a:t> </a:t>
+            </a:r>
+            <a:r>
+              <a:rPr lang="de-DE" sz="2000" b="1" dirty="0" err="1">
+                <a:solidFill>
+                  <a:srgbClr val="4C4C4C"/>
+                </a:solidFill>
+              </a:rPr>
+              <a:t>change</a:t>
+            </a:r>
+            <a:r>
+              <a:rPr lang="de-DE" sz="2000" b="1" dirty="0">
+                <a:solidFill>
+                  <a:srgbClr val="4C4C4C"/>
+                </a:solidFill>
+              </a:rPr>
+              <a:t> </a:t>
+            </a:r>
+            <a:r>
+              <a:rPr lang="de-DE" sz="2000" b="1" dirty="0" err="1">
+                <a:solidFill>
+                  <a:srgbClr val="4C4C4C"/>
+                </a:solidFill>
+              </a:rPr>
+              <a:t>value</a:t>
+            </a:r>
+            <a:r>
+              <a:rPr lang="de-DE" sz="2000" b="1" dirty="0">
+                <a:solidFill>
+                  <a:srgbClr val="4C4C4C"/>
+                </a:solidFill>
+              </a:rPr>
+              <a:t> </a:t>
+            </a:r>
+            <a:r>
+              <a:rPr lang="de-DE" sz="2000" b="1" dirty="0" err="1">
+                <a:solidFill>
+                  <a:srgbClr val="4C4C4C"/>
+                </a:solidFill>
+              </a:rPr>
+              <a:t>of</a:t>
+            </a:r>
+            <a:r>
+              <a:rPr lang="de-DE" sz="2000" b="1" dirty="0">
+                <a:solidFill>
+                  <a:srgbClr val="4C4C4C"/>
+                </a:solidFill>
+              </a:rPr>
+              <a:t> variable "</a:t>
+            </a:r>
+            <a:r>
+              <a:rPr lang="de-DE" sz="2000" b="1" dirty="0" err="1">
+                <a:solidFill>
+                  <a:srgbClr val="4C4C4C"/>
+                </a:solidFill>
+              </a:rPr>
+              <a:t>serverUrl</a:t>
+            </a:r>
+            <a:r>
+              <a:rPr lang="de-DE" sz="2000" b="1" dirty="0">
+                <a:solidFill>
+                  <a:srgbClr val="4C4C4C"/>
+                </a:solidFill>
+              </a:rPr>
+              <a:t>" (</a:t>
+            </a:r>
+            <a:r>
+              <a:rPr lang="de-DE" sz="2000" b="1" dirty="0" err="1">
+                <a:solidFill>
+                  <a:srgbClr val="4C4C4C"/>
+                </a:solidFill>
+              </a:rPr>
+              <a:t>by</a:t>
+            </a:r>
+            <a:r>
+              <a:rPr lang="de-DE" sz="2000" b="1" dirty="0">
+                <a:solidFill>
+                  <a:srgbClr val="4C4C4C"/>
+                </a:solidFill>
+              </a:rPr>
+              <a:t> </a:t>
+            </a:r>
+            <a:r>
+              <a:rPr lang="de-DE" sz="2000" b="1" dirty="0" err="1">
+                <a:solidFill>
+                  <a:srgbClr val="4C4C4C"/>
+                </a:solidFill>
+              </a:rPr>
+              <a:t>default</a:t>
+            </a:r>
+            <a:r>
+              <a:rPr lang="de-DE" sz="2000" b="1" dirty="0">
+                <a:solidFill>
+                  <a:srgbClr val="4C4C4C"/>
+                </a:solidFill>
+              </a:rPr>
+              <a:t> </a:t>
+            </a:r>
+            <a:r>
+              <a:rPr lang="de-DE" sz="2000" b="1" dirty="0" err="1">
+                <a:solidFill>
+                  <a:srgbClr val="4C4C4C"/>
+                </a:solidFill>
+              </a:rPr>
+              <a:t>it</a:t>
+            </a:r>
+            <a:r>
+              <a:rPr lang="de-DE" sz="2000" b="1" dirty="0">
+                <a:solidFill>
+                  <a:srgbClr val="4C4C4C"/>
+                </a:solidFill>
+              </a:rPr>
+              <a:t> </a:t>
+            </a:r>
+            <a:r>
+              <a:rPr lang="de-DE" sz="2000" b="1" dirty="0" err="1">
+                <a:solidFill>
+                  <a:srgbClr val="4C4C4C"/>
+                </a:solidFill>
+              </a:rPr>
+              <a:t>set</a:t>
+            </a:r>
+            <a:r>
+              <a:rPr lang="de-DE" sz="2000" b="1" dirty="0">
+                <a:solidFill>
+                  <a:srgbClr val="4C4C4C"/>
+                </a:solidFill>
+              </a:rPr>
+              <a:t> </a:t>
+            </a:r>
+            <a:r>
+              <a:rPr lang="de-DE" sz="2000" b="1" dirty="0" err="1">
+                <a:solidFill>
+                  <a:srgbClr val="4C4C4C"/>
+                </a:solidFill>
+              </a:rPr>
+              <a:t>to</a:t>
+            </a:r>
+            <a:r>
+              <a:rPr lang="de-DE" sz="2000" b="1" dirty="0">
+                <a:solidFill>
+                  <a:srgbClr val="4C4C4C"/>
+                </a:solidFill>
+              </a:rPr>
+              <a:t> "http:/</a:t>
+            </a:r>
+            <a:r>
+              <a:rPr lang="de-DE" sz="2000" b="1" dirty="0" smtClean="0">
+                <a:solidFill>
+                  <a:srgbClr val="4C4C4C"/>
+                </a:solidFill>
+              </a:rPr>
+              <a:t>/localhost:8080/</a:t>
+            </a:r>
+            <a:r>
+              <a:rPr lang="de-DE" sz="2000" b="1" dirty="0">
+                <a:solidFill>
+                  <a:srgbClr val="4C4C4C"/>
+                </a:solidFill>
+              </a:rPr>
+              <a:t>IDE/</a:t>
+            </a:r>
+            <a:r>
+              <a:rPr lang="de-DE" sz="2000" b="1" dirty="0" err="1">
+                <a:solidFill>
+                  <a:srgbClr val="4C4C4C"/>
+                </a:solidFill>
+              </a:rPr>
+              <a:t>rest</a:t>
+            </a:r>
+            <a:r>
+              <a:rPr lang="de-DE" sz="2000" b="1" dirty="0">
+                <a:solidFill>
+                  <a:srgbClr val="4C4C4C"/>
+                </a:solidFill>
+              </a:rPr>
+              <a:t>/</a:t>
+            </a:r>
+            <a:r>
+              <a:rPr lang="de-DE" sz="2000" b="1" dirty="0" err="1">
+                <a:solidFill>
+                  <a:srgbClr val="4C4C4C"/>
+                </a:solidFill>
+              </a:rPr>
+              <a:t>shop</a:t>
+            </a:r>
+            <a:r>
+              <a:rPr lang="de-DE" sz="2000" b="1" dirty="0">
+                <a:solidFill>
+                  <a:srgbClr val="4C4C4C"/>
+                </a:solidFill>
+              </a:rPr>
+              <a:t>") on </a:t>
+            </a:r>
+            <a:r>
+              <a:rPr lang="de-DE" sz="2000" b="1" dirty="0" err="1">
+                <a:solidFill>
+                  <a:srgbClr val="4C4C4C"/>
+                </a:solidFill>
+              </a:rPr>
+              <a:t>your</a:t>
+            </a:r>
+            <a:r>
+              <a:rPr lang="de-DE" sz="2000" b="1" dirty="0">
+                <a:solidFill>
+                  <a:srgbClr val="4C4C4C"/>
+                </a:solidFill>
+              </a:rPr>
+              <a:t> </a:t>
+            </a:r>
+            <a:r>
+              <a:rPr lang="de-DE" sz="2000" b="1" dirty="0" err="1" smtClean="0">
+                <a:solidFill>
+                  <a:srgbClr val="4C4C4C"/>
+                </a:solidFill>
+              </a:rPr>
+              <a:t>domain</a:t>
+            </a:r>
+            <a:r>
+              <a:rPr lang="de-DE" sz="2000" b="1" dirty="0" smtClean="0">
+                <a:solidFill>
+                  <a:srgbClr val="4C4C4C"/>
+                </a:solidFill>
+              </a:rPr>
+              <a:t> </a:t>
+            </a:r>
+            <a:r>
+              <a:rPr lang="de-DE" sz="2000" b="1" dirty="0" err="1" smtClean="0">
+                <a:solidFill>
+                  <a:srgbClr val="4C4C4C"/>
+                </a:solidFill>
+              </a:rPr>
+              <a:t>name</a:t>
+            </a:r>
+            <a:r>
+              <a:rPr lang="de-DE" sz="2000" b="1" dirty="0" smtClean="0">
+                <a:solidFill>
+                  <a:srgbClr val="4C4C4C"/>
+                </a:solidFill>
+              </a:rPr>
+              <a:t> </a:t>
+            </a:r>
+            <a:r>
+              <a:rPr lang="de-DE" sz="2000" b="1" dirty="0">
+                <a:solidFill>
+                  <a:srgbClr val="4C4C4C"/>
+                </a:solidFill>
+              </a:rPr>
+              <a:t>in </a:t>
+            </a:r>
+            <a:r>
+              <a:rPr lang="de-DE" sz="2000" b="1" dirty="0" err="1">
+                <a:solidFill>
+                  <a:srgbClr val="4C4C4C"/>
+                </a:solidFill>
+              </a:rPr>
+              <a:t>PhoneBookGadget.xml</a:t>
+            </a:r>
+            <a:r>
+              <a:rPr lang="de-DE" sz="2000" b="1" dirty="0">
+                <a:solidFill>
+                  <a:srgbClr val="4C4C4C"/>
+                </a:solidFill>
+              </a:rPr>
+              <a:t>.</a:t>
+            </a:r>
+          </a:p>
+          <a:p>
+            <a:pPr marL="258720" indent="-255544" hangingPunct="1">
+              <a:lnSpc>
+                <a:spcPct val="101000"/>
+              </a:lnSpc>
+              <a:spcAft>
+                <a:spcPts val="1425"/>
+              </a:spcAft>
+              <a:buClr>
+                <a:srgbClr val="FFA300"/>
+              </a:buClr>
+              <a:buSzPct val="150000"/>
+              <a:buFont typeface="Segoe UI" pitchFamily="32" charset="0"/>
+              <a:buChar char="»"/>
+              <a:tabLst>
+                <a:tab pos="258720" algn="l"/>
+                <a:tab pos="715842" algn="l"/>
+                <a:tab pos="1172964" algn="l"/>
+                <a:tab pos="1630086" algn="l"/>
+                <a:tab pos="2087210" algn="l"/>
+                <a:tab pos="2544332" algn="l"/>
+                <a:tab pos="3001454" algn="l"/>
+                <a:tab pos="3458576" algn="l"/>
+                <a:tab pos="3915700" algn="l"/>
+                <a:tab pos="4372822" algn="l"/>
+                <a:tab pos="4829945" algn="l"/>
+                <a:tab pos="5287068" algn="l"/>
+                <a:tab pos="5744189" algn="l"/>
+                <a:tab pos="6201313" algn="l"/>
+                <a:tab pos="6658435" algn="l"/>
+                <a:tab pos="7115557" algn="l"/>
+                <a:tab pos="7572681" algn="l"/>
+                <a:tab pos="8029802" algn="l"/>
+                <a:tab pos="8486925" algn="l"/>
+                <a:tab pos="8944049" algn="l"/>
+                <a:tab pos="9401170" algn="l"/>
+              </a:tabLst>
+            </a:pPr>
+            <a:r>
+              <a:rPr lang="de-DE" sz="2000" b="1" dirty="0" err="1" smtClean="0">
+                <a:solidFill>
+                  <a:srgbClr val="4C4C4C"/>
+                </a:solidFill>
+              </a:rPr>
+              <a:t>Now</a:t>
+            </a:r>
+            <a:r>
+              <a:rPr lang="de-DE" sz="2000" b="1" dirty="0" smtClean="0">
+                <a:solidFill>
+                  <a:srgbClr val="4C4C4C"/>
+                </a:solidFill>
+              </a:rPr>
+              <a:t> </a:t>
+            </a:r>
+            <a:r>
+              <a:rPr lang="de-DE" sz="2000" b="1" dirty="0" err="1">
+                <a:solidFill>
+                  <a:srgbClr val="4C4C4C"/>
+                </a:solidFill>
+              </a:rPr>
+              <a:t>you</a:t>
+            </a:r>
+            <a:r>
+              <a:rPr lang="de-DE" sz="2000" b="1" dirty="0">
+                <a:solidFill>
+                  <a:srgbClr val="4C4C4C"/>
+                </a:solidFill>
+              </a:rPr>
+              <a:t> </a:t>
+            </a:r>
+            <a:r>
+              <a:rPr lang="de-DE" sz="2000" b="1" dirty="0" err="1">
+                <a:solidFill>
+                  <a:srgbClr val="4C4C4C"/>
+                </a:solidFill>
+              </a:rPr>
+              <a:t>can</a:t>
+            </a:r>
+            <a:r>
+              <a:rPr lang="de-DE" sz="2000" b="1" dirty="0">
+                <a:solidFill>
+                  <a:srgbClr val="4C4C4C"/>
+                </a:solidFill>
+              </a:rPr>
+              <a:t> </a:t>
+            </a:r>
+            <a:r>
+              <a:rPr lang="de-DE" sz="2000" b="1" dirty="0" err="1">
+                <a:solidFill>
+                  <a:srgbClr val="4C4C4C"/>
+                </a:solidFill>
+              </a:rPr>
+              <a:t>now</a:t>
+            </a:r>
+            <a:r>
+              <a:rPr lang="de-DE" sz="2000" b="1" dirty="0">
+                <a:solidFill>
+                  <a:srgbClr val="4C4C4C"/>
+                </a:solidFill>
+              </a:rPr>
+              <a:t> </a:t>
+            </a:r>
+            <a:r>
+              <a:rPr lang="de-DE" sz="2000" b="1" dirty="0" err="1" smtClean="0">
+                <a:solidFill>
+                  <a:srgbClr val="4C4C4C"/>
+                </a:solidFill>
+              </a:rPr>
+              <a:t>test</a:t>
+            </a:r>
+            <a:r>
+              <a:rPr lang="de-DE" sz="2000" b="1" dirty="0" smtClean="0">
+                <a:solidFill>
+                  <a:srgbClr val="4C4C4C"/>
+                </a:solidFill>
+              </a:rPr>
+              <a:t> </a:t>
+            </a:r>
+            <a:r>
+              <a:rPr lang="de-DE" sz="2000" b="1" dirty="0" err="1" smtClean="0">
+                <a:solidFill>
+                  <a:srgbClr val="4C4C4C"/>
+                </a:solidFill>
+              </a:rPr>
+              <a:t>the</a:t>
+            </a:r>
+            <a:r>
+              <a:rPr lang="de-DE" sz="2000" b="1" dirty="0" smtClean="0">
+                <a:solidFill>
+                  <a:srgbClr val="4C4C4C"/>
+                </a:solidFill>
+              </a:rPr>
+              <a:t> </a:t>
+            </a:r>
+            <a:r>
+              <a:rPr lang="de-DE" sz="2000" b="1" dirty="0" err="1">
+                <a:solidFill>
+                  <a:srgbClr val="4C4C4C"/>
+                </a:solidFill>
+              </a:rPr>
+              <a:t>PhoneBookGadget.xml</a:t>
+            </a:r>
+            <a:r>
+              <a:rPr lang="de-DE" sz="2000" b="1" dirty="0">
+                <a:solidFill>
+                  <a:srgbClr val="4C4C4C"/>
+                </a:solidFill>
+              </a:rPr>
+              <a:t>.</a:t>
+            </a:r>
+          </a:p>
+          <a:p>
+            <a:pPr marL="258720" indent="-255544" hangingPunct="1">
+              <a:lnSpc>
+                <a:spcPct val="101000"/>
+              </a:lnSpc>
+              <a:spcAft>
+                <a:spcPts val="1425"/>
+              </a:spcAft>
+              <a:buClr>
+                <a:srgbClr val="FFA300"/>
+              </a:buClr>
+              <a:buSzPct val="150000"/>
+              <a:buFont typeface="Segoe UI" pitchFamily="32" charset="0"/>
+              <a:buChar char="»"/>
+              <a:tabLst>
+                <a:tab pos="258720" algn="l"/>
+                <a:tab pos="715842" algn="l"/>
+                <a:tab pos="1172964" algn="l"/>
+                <a:tab pos="1630086" algn="l"/>
+                <a:tab pos="2087210" algn="l"/>
+                <a:tab pos="2544332" algn="l"/>
+                <a:tab pos="3001454" algn="l"/>
+                <a:tab pos="3458576" algn="l"/>
+                <a:tab pos="3915700" algn="l"/>
+                <a:tab pos="4372822" algn="l"/>
+                <a:tab pos="4829945" algn="l"/>
+                <a:tab pos="5287068" algn="l"/>
+                <a:tab pos="5744189" algn="l"/>
+                <a:tab pos="6201313" algn="l"/>
+                <a:tab pos="6658435" algn="l"/>
+                <a:tab pos="7115557" algn="l"/>
+                <a:tab pos="7572681" algn="l"/>
+                <a:tab pos="8029802" algn="l"/>
+                <a:tab pos="8486925" algn="l"/>
+                <a:tab pos="8944049" algn="l"/>
+                <a:tab pos="9401170" algn="l"/>
+              </a:tabLst>
+            </a:pPr>
+            <a:r>
+              <a:rPr lang="de-DE" sz="2000" b="1" dirty="0" err="1">
+                <a:solidFill>
+                  <a:srgbClr val="4C4C4C"/>
+                </a:solidFill>
+              </a:rPr>
+              <a:t>To</a:t>
+            </a:r>
+            <a:r>
+              <a:rPr lang="de-DE" sz="2000" b="1" dirty="0">
+                <a:solidFill>
+                  <a:srgbClr val="4C4C4C"/>
+                </a:solidFill>
+              </a:rPr>
+              <a:t> </a:t>
+            </a:r>
+            <a:r>
+              <a:rPr lang="de-DE" sz="2000" b="1" dirty="0" err="1">
+                <a:solidFill>
+                  <a:srgbClr val="4C4C4C"/>
+                </a:solidFill>
+              </a:rPr>
+              <a:t>deploy</a:t>
+            </a:r>
+            <a:r>
+              <a:rPr lang="de-DE" sz="2000" b="1" dirty="0">
+                <a:solidFill>
+                  <a:srgbClr val="4C4C4C"/>
+                </a:solidFill>
+              </a:rPr>
+              <a:t> </a:t>
+            </a:r>
+            <a:r>
+              <a:rPr lang="de-DE" sz="2000" b="1" dirty="0" err="1">
+                <a:solidFill>
+                  <a:srgbClr val="4C4C4C"/>
+                </a:solidFill>
+              </a:rPr>
+              <a:t>your</a:t>
+            </a:r>
+            <a:r>
+              <a:rPr lang="de-DE" sz="2000" b="1" dirty="0">
+                <a:solidFill>
+                  <a:srgbClr val="4C4C4C"/>
+                </a:solidFill>
+              </a:rPr>
+              <a:t> </a:t>
+            </a:r>
+            <a:r>
+              <a:rPr lang="de-DE" sz="2000" b="1" dirty="0" err="1">
+                <a:solidFill>
+                  <a:srgbClr val="4C4C4C"/>
+                </a:solidFill>
+              </a:rPr>
+              <a:t>gadget</a:t>
+            </a:r>
+            <a:r>
+              <a:rPr lang="de-DE" sz="2000" b="1" dirty="0">
+                <a:solidFill>
+                  <a:srgbClr val="4C4C4C"/>
+                </a:solidFill>
+              </a:rPr>
+              <a:t> in </a:t>
+            </a:r>
+            <a:r>
+              <a:rPr lang="de-DE" sz="2000" b="1" dirty="0" err="1">
+                <a:solidFill>
+                  <a:srgbClr val="4C4C4C"/>
+                </a:solidFill>
+              </a:rPr>
+              <a:t>your</a:t>
+            </a:r>
+            <a:r>
+              <a:rPr lang="de-DE" sz="2000" b="1" dirty="0">
+                <a:solidFill>
+                  <a:srgbClr val="4C4C4C"/>
+                </a:solidFill>
+              </a:rPr>
+              <a:t> </a:t>
+            </a:r>
+            <a:r>
+              <a:rPr lang="de-DE" sz="2000" b="1" dirty="0" err="1">
+                <a:solidFill>
+                  <a:srgbClr val="4C4C4C"/>
+                </a:solidFill>
+              </a:rPr>
+              <a:t>iGoogle</a:t>
+            </a:r>
+            <a:r>
+              <a:rPr lang="de-DE" sz="2000" b="1" dirty="0">
+                <a:solidFill>
+                  <a:srgbClr val="4C4C4C"/>
+                </a:solidFill>
+              </a:rPr>
+              <a:t> </a:t>
+            </a:r>
+            <a:r>
+              <a:rPr lang="de-DE" sz="2000" b="1" dirty="0" err="1">
+                <a:solidFill>
+                  <a:srgbClr val="4C4C4C"/>
+                </a:solidFill>
+              </a:rPr>
+              <a:t>dashboard</a:t>
+            </a:r>
+            <a:r>
+              <a:rPr lang="de-DE" sz="2000" b="1" dirty="0">
+                <a:solidFill>
+                  <a:srgbClr val="4C4C4C"/>
+                </a:solidFill>
+              </a:rPr>
+              <a:t>. </a:t>
+            </a:r>
+            <a:r>
+              <a:rPr lang="de-DE" sz="2000" b="1" dirty="0" err="1">
+                <a:solidFill>
+                  <a:srgbClr val="4C4C4C"/>
+                </a:solidFill>
+              </a:rPr>
+              <a:t>Get</a:t>
+            </a:r>
+            <a:r>
+              <a:rPr lang="de-DE" sz="2000" b="1" dirty="0">
+                <a:solidFill>
+                  <a:srgbClr val="4C4C4C"/>
+                </a:solidFill>
+              </a:rPr>
+              <a:t> </a:t>
+            </a:r>
+            <a:r>
+              <a:rPr lang="de-DE" sz="2000" b="1" dirty="0" err="1">
+                <a:solidFill>
+                  <a:srgbClr val="4C4C4C"/>
+                </a:solidFill>
+              </a:rPr>
+              <a:t>the</a:t>
+            </a:r>
+            <a:r>
+              <a:rPr lang="de-DE" sz="2000" b="1" dirty="0">
+                <a:solidFill>
+                  <a:srgbClr val="4C4C4C"/>
+                </a:solidFill>
+              </a:rPr>
+              <a:t> URL </a:t>
+            </a:r>
+            <a:r>
+              <a:rPr lang="de-DE" sz="2000" b="1" dirty="0" err="1">
+                <a:solidFill>
+                  <a:srgbClr val="4C4C4C"/>
+                </a:solidFill>
+              </a:rPr>
+              <a:t>of</a:t>
+            </a:r>
+            <a:r>
+              <a:rPr lang="de-DE" sz="2000" b="1" dirty="0">
+                <a:solidFill>
+                  <a:srgbClr val="4C4C4C"/>
+                </a:solidFill>
+              </a:rPr>
+              <a:t> </a:t>
+            </a:r>
+            <a:r>
+              <a:rPr lang="de-DE" sz="2000" b="1" dirty="0" err="1">
+                <a:solidFill>
+                  <a:srgbClr val="4C4C4C"/>
+                </a:solidFill>
+              </a:rPr>
+              <a:t>the</a:t>
+            </a:r>
+            <a:r>
+              <a:rPr lang="de-DE" sz="2000" b="1" dirty="0">
+                <a:solidFill>
+                  <a:srgbClr val="4C4C4C"/>
+                </a:solidFill>
+              </a:rPr>
+              <a:t> </a:t>
+            </a:r>
+            <a:r>
+              <a:rPr lang="de-DE" sz="2000" b="1" dirty="0" err="1">
+                <a:solidFill>
+                  <a:srgbClr val="4C4C4C"/>
+                </a:solidFill>
+              </a:rPr>
+              <a:t>gadget</a:t>
+            </a:r>
+            <a:r>
+              <a:rPr lang="de-DE" sz="2000" b="1" dirty="0">
+                <a:solidFill>
+                  <a:srgbClr val="4C4C4C"/>
+                </a:solidFill>
+              </a:rPr>
+              <a:t> </a:t>
+            </a:r>
+            <a:r>
+              <a:rPr lang="de-DE" sz="2000" b="1" dirty="0" err="1">
+                <a:solidFill>
+                  <a:srgbClr val="4C4C4C"/>
+                </a:solidFill>
+              </a:rPr>
+              <a:t>from</a:t>
+            </a:r>
+            <a:r>
+              <a:rPr lang="de-DE" sz="2000" b="1" dirty="0">
+                <a:solidFill>
+                  <a:srgbClr val="4C4C4C"/>
+                </a:solidFill>
+              </a:rPr>
+              <a:t> </a:t>
+            </a:r>
+            <a:r>
+              <a:rPr lang="de-DE" sz="2000" b="1" dirty="0" err="1">
+                <a:solidFill>
+                  <a:srgbClr val="4C4C4C"/>
+                </a:solidFill>
+              </a:rPr>
+              <a:t>the</a:t>
+            </a:r>
+            <a:r>
+              <a:rPr lang="de-DE" sz="2000" b="1" dirty="0">
+                <a:solidFill>
+                  <a:srgbClr val="4C4C4C"/>
+                </a:solidFill>
+              </a:rPr>
+              <a:t> View </a:t>
+            </a:r>
+            <a:r>
+              <a:rPr lang="de-DE" sz="2000" b="1" dirty="0" err="1">
+                <a:solidFill>
+                  <a:srgbClr val="4C4C4C"/>
+                </a:solidFill>
+              </a:rPr>
+              <a:t>menu</a:t>
+            </a:r>
+            <a:r>
+              <a:rPr lang="de-DE" sz="2000" b="1" dirty="0">
+                <a:solidFill>
+                  <a:srgbClr val="4C4C4C"/>
+                </a:solidFill>
+              </a:rPr>
+              <a:t>, </a:t>
+            </a:r>
+            <a:r>
+              <a:rPr lang="de-DE" sz="2000" b="1" dirty="0" err="1">
+                <a:solidFill>
+                  <a:srgbClr val="4C4C4C"/>
+                </a:solidFill>
+              </a:rPr>
+              <a:t>removing</a:t>
+            </a:r>
+            <a:r>
+              <a:rPr lang="de-DE" sz="2000" b="1" dirty="0">
+                <a:solidFill>
+                  <a:srgbClr val="4C4C4C"/>
+                </a:solidFill>
+              </a:rPr>
+              <a:t> "/private" </a:t>
+            </a:r>
+            <a:r>
+              <a:rPr lang="de-DE" sz="2000" b="1" dirty="0" err="1">
+                <a:solidFill>
+                  <a:srgbClr val="4C4C4C"/>
+                </a:solidFill>
+              </a:rPr>
+              <a:t>from</a:t>
+            </a:r>
+            <a:r>
+              <a:rPr lang="de-DE" sz="2000" b="1" dirty="0">
+                <a:solidFill>
+                  <a:srgbClr val="4C4C4C"/>
+                </a:solidFill>
+              </a:rPr>
+              <a:t> </a:t>
+            </a:r>
+            <a:r>
+              <a:rPr lang="de-DE" sz="2000" b="1" dirty="0" err="1">
+                <a:solidFill>
+                  <a:srgbClr val="4C4C4C"/>
+                </a:solidFill>
+              </a:rPr>
+              <a:t>the</a:t>
+            </a:r>
+            <a:r>
+              <a:rPr lang="de-DE" sz="2000" b="1" dirty="0">
+                <a:solidFill>
+                  <a:srgbClr val="4C4C4C"/>
+                </a:solidFill>
+              </a:rPr>
+              <a:t> URL.</a:t>
+            </a:r>
+            <a:endParaRPr lang="de-DE" sz="2000" b="1" dirty="0">
+              <a:solidFill>
+                <a:srgbClr val="4C4C4C"/>
+              </a:solidFill>
+            </a:endParaRPr>
+          </a:p>
+          <a:p>
+            <a:pPr marL="258720" indent="-255544" hangingPunct="1">
+              <a:lnSpc>
+                <a:spcPct val="101000"/>
+              </a:lnSpc>
+              <a:spcAft>
+                <a:spcPts val="1425"/>
+              </a:spcAft>
+              <a:buClr>
+                <a:srgbClr val="FFA300"/>
+              </a:buClr>
+              <a:buSzPct val="150000"/>
+              <a:buFont typeface="Segoe UI" pitchFamily="32" charset="0"/>
+              <a:buChar char="»"/>
+              <a:tabLst>
+                <a:tab pos="258720" algn="l"/>
+                <a:tab pos="715842" algn="l"/>
+                <a:tab pos="1172964" algn="l"/>
+                <a:tab pos="1630086" algn="l"/>
+                <a:tab pos="2087210" algn="l"/>
+                <a:tab pos="2544332" algn="l"/>
+                <a:tab pos="3001454" algn="l"/>
+                <a:tab pos="3458576" algn="l"/>
+                <a:tab pos="3915700" algn="l"/>
+                <a:tab pos="4372822" algn="l"/>
+                <a:tab pos="4829945" algn="l"/>
+                <a:tab pos="5287068" algn="l"/>
+                <a:tab pos="5744189" algn="l"/>
+                <a:tab pos="6201313" algn="l"/>
+                <a:tab pos="6658435" algn="l"/>
+                <a:tab pos="7115557" algn="l"/>
+                <a:tab pos="7572681" algn="l"/>
+                <a:tab pos="8029802" algn="l"/>
+                <a:tab pos="8486925" algn="l"/>
+                <a:tab pos="8944049" algn="l"/>
+                <a:tab pos="9401170" algn="l"/>
+              </a:tabLst>
+            </a:pPr>
+            <a:endParaRPr lang="en-GB" sz="2800" b="1" i="1" dirty="0">
+              <a:solidFill>
+                <a:srgbClr val="333333"/>
+              </a:solidFill>
+            </a:endParaRPr>
+          </a:p>
+          <a:p>
+            <a:pPr marL="258720" indent="-255544" hangingPunct="1">
+              <a:lnSpc>
+                <a:spcPct val="92000"/>
+              </a:lnSpc>
+              <a:spcAft>
+                <a:spcPts val="1425"/>
+              </a:spcAft>
+              <a:buSzPct val="70000"/>
+              <a:tabLst>
+                <a:tab pos="258720" algn="l"/>
+                <a:tab pos="715842" algn="l"/>
+                <a:tab pos="1172964" algn="l"/>
+                <a:tab pos="1630086" algn="l"/>
+                <a:tab pos="2087210" algn="l"/>
+                <a:tab pos="2544332" algn="l"/>
+                <a:tab pos="3001454" algn="l"/>
+                <a:tab pos="3458576" algn="l"/>
+                <a:tab pos="3915700" algn="l"/>
+                <a:tab pos="4372822" algn="l"/>
+                <a:tab pos="4829945" algn="l"/>
+                <a:tab pos="5287068" algn="l"/>
+                <a:tab pos="5744189" algn="l"/>
+                <a:tab pos="6201313" algn="l"/>
+                <a:tab pos="6658435" algn="l"/>
+                <a:tab pos="7115557" algn="l"/>
+                <a:tab pos="7572681" algn="l"/>
+                <a:tab pos="8029802" algn="l"/>
+                <a:tab pos="8486925" algn="l"/>
+                <a:tab pos="8944049" algn="l"/>
+                <a:tab pos="9401170" algn="l"/>
+              </a:tabLst>
+            </a:pPr>
+            <a:endParaRPr lang="en-GB" sz="2800" b="1" i="1" dirty="0">
+              <a:solidFill>
+                <a:srgbClr val="333333"/>
+              </a:solidFill>
+            </a:endParaRPr>
+          </a:p>
+          <a:p>
+            <a:pPr marL="258720" indent="-255544" hangingPunct="1">
+              <a:lnSpc>
+                <a:spcPct val="101000"/>
+              </a:lnSpc>
+              <a:spcAft>
+                <a:spcPts val="1425"/>
+              </a:spcAft>
+              <a:buClr>
+                <a:srgbClr val="FFA300"/>
+              </a:buClr>
+              <a:buSzPct val="150000"/>
+              <a:tabLst>
+                <a:tab pos="258720" algn="l"/>
+                <a:tab pos="715842" algn="l"/>
+                <a:tab pos="1172964" algn="l"/>
+                <a:tab pos="1630086" algn="l"/>
+                <a:tab pos="2087210" algn="l"/>
+                <a:tab pos="2544332" algn="l"/>
+                <a:tab pos="3001454" algn="l"/>
+                <a:tab pos="3458576" algn="l"/>
+                <a:tab pos="3915700" algn="l"/>
+                <a:tab pos="4372822" algn="l"/>
+                <a:tab pos="4829945" algn="l"/>
+                <a:tab pos="5287068" algn="l"/>
+                <a:tab pos="5744189" algn="l"/>
+                <a:tab pos="6201313" algn="l"/>
+                <a:tab pos="6658435" algn="l"/>
+                <a:tab pos="7115557" algn="l"/>
+                <a:tab pos="7572681" algn="l"/>
+                <a:tab pos="8029802" algn="l"/>
+                <a:tab pos="8486925" algn="l"/>
+                <a:tab pos="8944049" algn="l"/>
+                <a:tab pos="9401170" algn="l"/>
+              </a:tabLst>
+            </a:pPr>
+            <a:endParaRPr lang="en-US" sz="2000" b="1" i="1" dirty="0">
+              <a:solidFill>
+                <a:srgbClr val="4C4C4C"/>
+              </a:solidFill>
+            </a:endParaRPr>
+          </a:p>
+          <a:p>
+            <a:pPr marL="258720" indent="-255544" hangingPunct="1">
+              <a:lnSpc>
+                <a:spcPct val="101000"/>
+              </a:lnSpc>
+              <a:spcAft>
+                <a:spcPts val="1425"/>
+              </a:spcAft>
+              <a:buClr>
+                <a:srgbClr val="FFA300"/>
+              </a:buClr>
+              <a:buSzPct val="150000"/>
+              <a:tabLst>
+                <a:tab pos="258720" algn="l"/>
+                <a:tab pos="715842" algn="l"/>
+                <a:tab pos="1172964" algn="l"/>
+                <a:tab pos="1630086" algn="l"/>
+                <a:tab pos="2087210" algn="l"/>
+                <a:tab pos="2544332" algn="l"/>
+                <a:tab pos="3001454" algn="l"/>
+                <a:tab pos="3458576" algn="l"/>
+                <a:tab pos="3915700" algn="l"/>
+                <a:tab pos="4372822" algn="l"/>
+                <a:tab pos="4829945" algn="l"/>
+                <a:tab pos="5287068" algn="l"/>
+                <a:tab pos="5744189" algn="l"/>
+                <a:tab pos="6201313" algn="l"/>
+                <a:tab pos="6658435" algn="l"/>
+                <a:tab pos="7115557" algn="l"/>
+                <a:tab pos="7572681" algn="l"/>
+                <a:tab pos="8029802" algn="l"/>
+                <a:tab pos="8486925" algn="l"/>
+                <a:tab pos="8944049" algn="l"/>
+                <a:tab pos="9401170" algn="l"/>
+              </a:tabLst>
+            </a:pPr>
+            <a:endParaRPr lang="en-US" sz="2000" b="1" i="1" dirty="0">
+              <a:solidFill>
+                <a:srgbClr val="4C4C4C"/>
+              </a:solidFill>
+            </a:endParaRPr>
+          </a:p>
+        </p:txBody>
+      </p:sp>
+    </p:spTree>
+    <p:extLst>
+      <p:ext uri="{BB962C8B-B14F-4D97-AF65-F5344CB8AC3E}">
+        <p14:creationId xmlns:p14="http://schemas.microsoft.com/office/powerpoint/2010/main" val="3848645669"/>
+      </p:ext>
+    </p:extLst>
+  </p:cSld>
+  <p:clrMapOvr>
+    <a:masterClrMapping/>
+  </p:clrMapOvr>
+  <p:transition xmlns:p14="http://schemas.microsoft.com/office/powerpoint/2010/main" spd="med">
+    <p:wipe dir="r"/>
+  </p:transition>
+  <p:timing>
+    <p:tnLst>
+      <p:par>
+        <p:cTn xmlns:p14="http://schemas.microsoft.com/office/powerpoint/2010/main" id="1" dur="indefinite" restart="never" nodeType="tmRoot">
+          <p:childTnLst>
+            <p:seq concurrent="1" nextAc="seek">
+              <p:cTn id="2" dur="indefinite" nodeType="mainSeq"/>
+              <p:prevCondLst>
+                <p:cond evt="onPrev" delay="0">
+                  <p:tgtEl>
+                    <p:sldTgt/>
+                  </p:tgtEl>
+                </p:cond>
+              </p:prevCondLst>
+              <p:nextCondLst>
+                <p:cond evt="onNext" delay="0">
+                  <p:tgtEl>
+                    <p:sldTgt/>
+                  </p:tgtEl>
+                </p:cond>
+              </p:nextCondLst>
+            </p:seq>
+          </p:childTnLst>
+        </p:cTn>
+      </p:par>
+    </p:tnLst>
+  </p:timing>
+</p:sld>
+</file>
+
+<file path=ppt/slides/slide33.xml><?xml version="1.0" encoding="utf-8"?>
 <p:sld xmlns:a="http://schemas.openxmlformats.org/drawingml/2006/main" xmlns:r="http://schemas.openxmlformats.org/officeDocument/2006/relationships" xmlns:p="http://schemas.openxmlformats.org/presentationml/2006/main">
   <p:cSld>
     <p:spTree>
@@ -43338,11 +45086,6 @@
               </a:rPr>
               <a:t> - JCR Comparison</a:t>
             </a:r>
-            <a:endParaRPr lang="en-GB" sz="4800" dirty="0">
-              <a:solidFill>
-                <a:srgbClr val="FFFFFF"/>
-              </a:solidFill>
-            </a:endParaRPr>
           </a:p>
         </p:txBody>
       </p:sp>
@@ -43471,11 +45214,6 @@
               </a:rPr>
               <a:t>JCR</a:t>
             </a:r>
-            <a:endParaRPr lang="en-GB" sz="3600" dirty="0">
-              <a:solidFill>
-                <a:srgbClr val="FFA300"/>
-              </a:solidFill>
-            </a:endParaRPr>
           </a:p>
         </p:txBody>
       </p:sp>
@@ -43742,11 +45480,6 @@
               </a:rPr>
               <a:t> Comparison</a:t>
             </a:r>
-            <a:endParaRPr lang="en-GB" sz="3600" dirty="0">
-              <a:solidFill>
-                <a:srgbClr val="FFA300"/>
-              </a:solidFill>
-            </a:endParaRPr>
           </a:p>
         </p:txBody>
       </p:sp>
@@ -44276,11 +46009,6 @@
               </a:rPr>
               <a:t>JCR Way</a:t>
             </a:r>
-            <a:endParaRPr lang="en-GB" sz="3600" dirty="0">
-              <a:solidFill>
-                <a:srgbClr val="FFA300"/>
-              </a:solidFill>
-            </a:endParaRPr>
           </a:p>
         </p:txBody>
       </p:sp>
@@ -45497,11 +47225,6 @@
               </a:rPr>
               <a:t>JCR Way – Not type safe</a:t>
             </a:r>
-            <a:endParaRPr lang="en-GB" sz="3600" dirty="0">
-              <a:solidFill>
-                <a:srgbClr val="FFA300"/>
-              </a:solidFill>
-            </a:endParaRPr>
           </a:p>
         </p:txBody>
       </p:sp>
@@ -46889,11 +48612,6 @@
               </a:rPr>
               <a:t> Way – provides type safety</a:t>
             </a:r>
-            <a:endParaRPr lang="en-GB" sz="3600" dirty="0">
-              <a:solidFill>
-                <a:srgbClr val="FFA300"/>
-              </a:solidFill>
-            </a:endParaRPr>
           </a:p>
         </p:txBody>
       </p:sp>

</xml_diff>